<commit_message>
Update 13.第十三课  Transform组件,Time, Camera.pptx
</commit_message>
<xml_diff>
--- a/教学课件/13.第十三课  Transform组件,Time, Camera.pptx
+++ b/教学课件/13.第十三课  Transform组件,Time, Camera.pptx
@@ -5815,8 +5815,8 @@
         </p:nvSpPr>
         <p:spPr>
           <a:xfrm>
-            <a:off x="838200" y="88265"/>
-            <a:ext cx="10515600" cy="6647815"/>
+            <a:off x="838200" y="232410"/>
+            <a:ext cx="10515600" cy="6503670"/>
           </a:xfrm>
         </p:spPr>
         <p:txBody>
@@ -6005,19 +6005,37 @@
               <a:rPr lang="zh-CN" altLang="en-US" sz="2000">
                 <a:sym typeface="+mn-ea"/>
               </a:rPr>
-              <a:t>：</a:t>
+              <a:t>：表示</a:t>
             </a:r>
             <a:r>
               <a:rPr lang="zh-CN" altLang="en-US" sz="2000" b="1">
                 <a:sym typeface="+mn-ea"/>
               </a:rPr>
-              <a:t>自身</a:t>
+              <a:t>自身右</a:t>
             </a:r>
             <a:r>
               <a:rPr lang="zh-CN" altLang="en-US" sz="2000">
                 <a:sym typeface="+mn-ea"/>
               </a:rPr>
-              <a:t>右方向</a:t>
+              <a:t>方向的向量</a:t>
+            </a:r>
+            <a:r>
+              <a:rPr lang="en-US" altLang="zh-CN" sz="2000">
+                <a:sym typeface="+mn-ea"/>
+              </a:rPr>
+              <a:t>(</a:t>
+            </a:r>
+            <a:r>
+              <a:rPr lang="zh-CN" altLang="en-US" sz="2000">
+                <a:sym typeface="+mn-ea"/>
+              </a:rPr>
+              <a:t>世界坐标</a:t>
+            </a:r>
+            <a:r>
+              <a:rPr lang="en-US" altLang="zh-CN" sz="2000">
+                <a:sym typeface="+mn-ea"/>
+              </a:rPr>
+              <a:t>)</a:t>
             </a:r>
             <a:endParaRPr lang="zh-CN" altLang="en-US" sz="2000"/>
           </a:p>
@@ -6038,16 +6056,22 @@
               <a:t>： </a:t>
             </a:r>
             <a:r>
+              <a:rPr lang="zh-CN" altLang="en-US" sz="2000">
+                <a:sym typeface="+mn-ea"/>
+              </a:rPr>
+              <a:t>表示</a:t>
+            </a:r>
+            <a:r>
               <a:rPr lang="zh-CN" altLang="en-US" sz="2000" b="1">
                 <a:sym typeface="+mn-ea"/>
               </a:rPr>
-              <a:t>自身</a:t>
+              <a:t>自身上方</a:t>
             </a:r>
             <a:r>
               <a:rPr lang="zh-CN" altLang="en-US" sz="2000">
                 <a:sym typeface="+mn-ea"/>
               </a:rPr>
-              <a:t>上方向</a:t>
+              <a:t>向的向量</a:t>
             </a:r>
             <a:endParaRPr lang="zh-CN" altLang="en-US" sz="2000"/>
           </a:p>
@@ -6068,16 +6092,22 @@
               <a:t>： </a:t>
             </a:r>
             <a:r>
+              <a:rPr lang="zh-CN" altLang="en-US" sz="2000">
+                <a:sym typeface="+mn-ea"/>
+              </a:rPr>
+              <a:t>表示</a:t>
+            </a:r>
+            <a:r>
               <a:rPr lang="zh-CN" altLang="en-US" sz="2000" b="1">
                 <a:sym typeface="+mn-ea"/>
               </a:rPr>
-              <a:t>自身</a:t>
+              <a:t>自身正前</a:t>
             </a:r>
             <a:r>
               <a:rPr lang="zh-CN" altLang="en-US" sz="2000">
                 <a:sym typeface="+mn-ea"/>
               </a:rPr>
-              <a:t>前方向 </a:t>
+              <a:t>方向 的向量</a:t>
             </a:r>
             <a:endParaRPr lang="zh-CN" altLang="en-US" sz="2000"/>
           </a:p>
@@ -6507,6 +6537,14 @@
             <a:r>
               <a:rPr lang="zh-CN" altLang="en-US" sz="1800"/>
               <a:t>朝向某个物体</a:t>
+            </a:r>
+            <a:r>
+              <a:rPr lang="en-US" altLang="zh-CN" sz="1800"/>
+              <a:t>,</a:t>
+            </a:r>
+            <a:r>
+              <a:rPr lang="zh-CN" altLang="en-US" sz="1800"/>
+              <a:t>看向世界坐标系中的某个点</a:t>
             </a:r>
             <a:endParaRPr lang="zh-CN" altLang="en-US" sz="1800"/>
           </a:p>

</xml_diff>